<commit_message>
[TRMS] Source code runned
Demo video is available !
</commit_message>
<xml_diff>
--- a/Doc/Presentation.PPTX
+++ b/Doc/Presentation.PPTX
@@ -11,18 +11,19 @@
     <p:sldId id="258" r:id="rId5"/>
     <p:sldId id="259" r:id="rId6"/>
     <p:sldId id="260" r:id="rId7"/>
-    <p:sldId id="261" r:id="rId8"/>
-    <p:sldId id="264" r:id="rId9"/>
-    <p:sldId id="262" r:id="rId10"/>
-    <p:sldId id="265" r:id="rId11"/>
-    <p:sldId id="266" r:id="rId12"/>
-    <p:sldId id="267" r:id="rId13"/>
-    <p:sldId id="268" r:id="rId14"/>
-    <p:sldId id="272" r:id="rId15"/>
-    <p:sldId id="273" r:id="rId16"/>
-    <p:sldId id="274" r:id="rId17"/>
-    <p:sldId id="270" r:id="rId18"/>
-    <p:sldId id="271" r:id="rId19"/>
+    <p:sldId id="275" r:id="rId8"/>
+    <p:sldId id="261" r:id="rId9"/>
+    <p:sldId id="264" r:id="rId10"/>
+    <p:sldId id="262" r:id="rId11"/>
+    <p:sldId id="265" r:id="rId12"/>
+    <p:sldId id="266" r:id="rId13"/>
+    <p:sldId id="267" r:id="rId14"/>
+    <p:sldId id="268" r:id="rId15"/>
+    <p:sldId id="272" r:id="rId16"/>
+    <p:sldId id="273" r:id="rId17"/>
+    <p:sldId id="274" r:id="rId18"/>
+    <p:sldId id="270" r:id="rId19"/>
+    <p:sldId id="271" r:id="rId20"/>
   </p:sldIdLst>
   <p:sldSz cx="12192000" cy="6858000"/>
   <p:notesSz cx="6858000" cy="9144000"/>
@@ -121,6 +122,11 @@
       </a:defRPr>
     </a:lvl9pPr>
   </p:defaultTextStyle>
+  <p:extLst>
+    <p:ext uri="{EFAFB233-063F-42B5-8137-9DF3F51BA10A}">
+      <p15:sldGuideLst xmlns:p15="http://schemas.microsoft.com/office/powerpoint/2012/main"/>
+    </p:ext>
+  </p:extLst>
 </p:presentation>
 </file>
 
@@ -229,6 +235,11 @@
               </a:ln>
               <a:effectLst/>
             </c:spPr>
+            <c:extLst>
+              <c:ext xmlns:c16="http://schemas.microsoft.com/office/drawing/2014/chart" uri="{C3380CC4-5D6E-409C-BE32-E72D297353CC}">
+                <c16:uniqueId val="{00000001-684E-43EF-8647-216C25156C10}"/>
+              </c:ext>
+            </c:extLst>
           </c:dPt>
           <c:dPt>
             <c:idx val="1"/>
@@ -244,6 +255,11 @@
               </a:ln>
               <a:effectLst/>
             </c:spPr>
+            <c:extLst>
+              <c:ext xmlns:c16="http://schemas.microsoft.com/office/drawing/2014/chart" uri="{C3380CC4-5D6E-409C-BE32-E72D297353CC}">
+                <c16:uniqueId val="{00000003-684E-43EF-8647-216C25156C10}"/>
+              </c:ext>
+            </c:extLst>
           </c:dPt>
           <c:dLbls>
             <c:spPr>
@@ -5730,15 +5746,15 @@
     </dgm:pt>
   </dgm:ptLst>
   <dgm:cxnLst>
+    <dgm:cxn modelId="{2AE660D7-A089-48A5-91B5-84AD7B062F86}" srcId="{7476F159-49E1-4416-B9E2-54DD5DDFA089}" destId="{2F16F65B-49F7-4CC2-B746-0913BD27C1E5}" srcOrd="0" destOrd="0" parTransId="{2A8F1D31-ABA1-4DD2-B3BB-435F6B8FCA6A}" sibTransId="{29577D44-524D-4B87-A749-35A94F9638E7}"/>
+    <dgm:cxn modelId="{E99EB000-280F-47CE-8925-299272669C62}" srcId="{7476F159-49E1-4416-B9E2-54DD5DDFA089}" destId="{AC21FFB5-4BCA-4E0F-A1DA-F64B24069BE5}" srcOrd="2" destOrd="0" parTransId="{E680CA4C-E0D3-4213-9423-38374F069FE8}" sibTransId="{28CD6EBD-FA84-4103-AADB-5946CAF651C9}"/>
+    <dgm:cxn modelId="{D1A58AB4-6FDF-4314-B85C-CA3D1608017C}" type="presOf" srcId="{AC21FFB5-4BCA-4E0F-A1DA-F64B24069BE5}" destId="{39211FF5-348C-4A76-AA9C-D351C9B1BAD2}" srcOrd="0" destOrd="0" presId="urn:microsoft.com/office/officeart/2005/8/layout/vList2"/>
+    <dgm:cxn modelId="{8E61D6F6-6E32-45B9-BA3F-C13CB0ABFFCE}" srcId="{7476F159-49E1-4416-B9E2-54DD5DDFA089}" destId="{28EF8224-933E-4DA6-BED1-74CC1C97FA64}" srcOrd="1" destOrd="0" parTransId="{51DDF731-366B-40C6-9D01-293EC760E8FA}" sibTransId="{1F656A3E-EC1A-4E2A-84F1-9AB0934499F7}"/>
+    <dgm:cxn modelId="{596B40D7-0990-4A07-B93B-8B4F04B83560}" type="presOf" srcId="{28EF8224-933E-4DA6-BED1-74CC1C97FA64}" destId="{99CC76DB-4961-49EB-B8AA-4B0D2A02A9CE}" srcOrd="0" destOrd="0" presId="urn:microsoft.com/office/officeart/2005/8/layout/vList2"/>
     <dgm:cxn modelId="{1363DF87-C13C-46BB-8DBB-BD41661B8CD4}" srcId="{7476F159-49E1-4416-B9E2-54DD5DDFA089}" destId="{EAA7BFA6-313E-482E-BC8B-1CDAB13D8C7F}" srcOrd="3" destOrd="0" parTransId="{9FCC6A98-AC79-4406-A6F4-D0CE026BDB14}" sibTransId="{21DE1C45-B6C4-4269-9F5C-0751EE61635B}"/>
-    <dgm:cxn modelId="{596B40D7-0990-4A07-B93B-8B4F04B83560}" type="presOf" srcId="{28EF8224-933E-4DA6-BED1-74CC1C97FA64}" destId="{99CC76DB-4961-49EB-B8AA-4B0D2A02A9CE}" srcOrd="0" destOrd="0" presId="urn:microsoft.com/office/officeart/2005/8/layout/vList2"/>
-    <dgm:cxn modelId="{2AE660D7-A089-48A5-91B5-84AD7B062F86}" srcId="{7476F159-49E1-4416-B9E2-54DD5DDFA089}" destId="{2F16F65B-49F7-4CC2-B746-0913BD27C1E5}" srcOrd="0" destOrd="0" parTransId="{2A8F1D31-ABA1-4DD2-B3BB-435F6B8FCA6A}" sibTransId="{29577D44-524D-4B87-A749-35A94F9638E7}"/>
-    <dgm:cxn modelId="{8E61D6F6-6E32-45B9-BA3F-C13CB0ABFFCE}" srcId="{7476F159-49E1-4416-B9E2-54DD5DDFA089}" destId="{28EF8224-933E-4DA6-BED1-74CC1C97FA64}" srcOrd="1" destOrd="0" parTransId="{51DDF731-366B-40C6-9D01-293EC760E8FA}" sibTransId="{1F656A3E-EC1A-4E2A-84F1-9AB0934499F7}"/>
+    <dgm:cxn modelId="{80F53FEE-6AEF-4160-B22B-8DB5FE12061F}" type="presOf" srcId="{2F16F65B-49F7-4CC2-B746-0913BD27C1E5}" destId="{9044C1EB-2512-4F54-AAAB-6ED292E5BD0C}" srcOrd="0" destOrd="0" presId="urn:microsoft.com/office/officeart/2005/8/layout/vList2"/>
+    <dgm:cxn modelId="{0C41FE70-5154-4602-9408-1F3E7753678F}" type="presOf" srcId="{7476F159-49E1-4416-B9E2-54DD5DDFA089}" destId="{65A3F248-B1E5-4A64-9A17-634FB8E31022}" srcOrd="0" destOrd="0" presId="urn:microsoft.com/office/officeart/2005/8/layout/vList2"/>
     <dgm:cxn modelId="{C8C644A4-B26B-4676-8036-926E72BB1AC6}" type="presOf" srcId="{EAA7BFA6-313E-482E-BC8B-1CDAB13D8C7F}" destId="{3BD0414B-C050-44F0-BA25-8F96F8C8290C}" srcOrd="0" destOrd="0" presId="urn:microsoft.com/office/officeart/2005/8/layout/vList2"/>
-    <dgm:cxn modelId="{E99EB000-280F-47CE-8925-299272669C62}" srcId="{7476F159-49E1-4416-B9E2-54DD5DDFA089}" destId="{AC21FFB5-4BCA-4E0F-A1DA-F64B24069BE5}" srcOrd="2" destOrd="0" parTransId="{E680CA4C-E0D3-4213-9423-38374F069FE8}" sibTransId="{28CD6EBD-FA84-4103-AADB-5946CAF651C9}"/>
-    <dgm:cxn modelId="{0C41FE70-5154-4602-9408-1F3E7753678F}" type="presOf" srcId="{7476F159-49E1-4416-B9E2-54DD5DDFA089}" destId="{65A3F248-B1E5-4A64-9A17-634FB8E31022}" srcOrd="0" destOrd="0" presId="urn:microsoft.com/office/officeart/2005/8/layout/vList2"/>
-    <dgm:cxn modelId="{80F53FEE-6AEF-4160-B22B-8DB5FE12061F}" type="presOf" srcId="{2F16F65B-49F7-4CC2-B746-0913BD27C1E5}" destId="{9044C1EB-2512-4F54-AAAB-6ED292E5BD0C}" srcOrd="0" destOrd="0" presId="urn:microsoft.com/office/officeart/2005/8/layout/vList2"/>
-    <dgm:cxn modelId="{D1A58AB4-6FDF-4314-B85C-CA3D1608017C}" type="presOf" srcId="{AC21FFB5-4BCA-4E0F-A1DA-F64B24069BE5}" destId="{39211FF5-348C-4A76-AA9C-D351C9B1BAD2}" srcOrd="0" destOrd="0" presId="urn:microsoft.com/office/officeart/2005/8/layout/vList2"/>
     <dgm:cxn modelId="{9DB012ED-C9EF-44FD-BDF4-04E8A796D6EB}" type="presParOf" srcId="{65A3F248-B1E5-4A64-9A17-634FB8E31022}" destId="{9044C1EB-2512-4F54-AAAB-6ED292E5BD0C}" srcOrd="0" destOrd="0" presId="urn:microsoft.com/office/officeart/2005/8/layout/vList2"/>
     <dgm:cxn modelId="{EE1C6189-CB6A-40FB-BCC6-9D41C8719675}" type="presParOf" srcId="{65A3F248-B1E5-4A64-9A17-634FB8E31022}" destId="{B462A412-F365-4BFC-A2F6-86B65457AE34}" srcOrd="1" destOrd="0" presId="urn:microsoft.com/office/officeart/2005/8/layout/vList2"/>
     <dgm:cxn modelId="{F0309CFD-048B-49A9-BF9C-91F614C565BF}" type="presParOf" srcId="{65A3F248-B1E5-4A64-9A17-634FB8E31022}" destId="{99CC76DB-4961-49EB-B8AA-4B0D2A02A9CE}" srcOrd="2" destOrd="0" presId="urn:microsoft.com/office/officeart/2005/8/layout/vList2"/>
@@ -7759,7 +7775,7 @@
           <a:p>
             <a:fld id="{29DDCA62-2A69-4F01-9E41-038E948DE023}" type="datetimeFigureOut">
               <a:rPr lang="en-US" smtClean="0"/>
-              <a:t>22/3/2020</a:t>
+              <a:t>11/5/2020</a:t>
             </a:fld>
             <a:endParaRPr lang="en-US"/>
           </a:p>
@@ -7967,7 +7983,7 @@
           <a:p>
             <a:fld id="{29DDCA62-2A69-4F01-9E41-038E948DE023}" type="datetimeFigureOut">
               <a:rPr lang="en-US" smtClean="0"/>
-              <a:t>22/3/2020</a:t>
+              <a:t>11/5/2020</a:t>
             </a:fld>
             <a:endParaRPr lang="en-US"/>
           </a:p>
@@ -8223,7 +8239,7 @@
           <a:p>
             <a:fld id="{29DDCA62-2A69-4F01-9E41-038E948DE023}" type="datetimeFigureOut">
               <a:rPr lang="en-US" smtClean="0"/>
-              <a:t>22/3/2020</a:t>
+              <a:t>11/5/2020</a:t>
             </a:fld>
             <a:endParaRPr lang="en-US"/>
           </a:p>
@@ -8397,7 +8413,7 @@
           <a:p>
             <a:fld id="{29DDCA62-2A69-4F01-9E41-038E948DE023}" type="datetimeFigureOut">
               <a:rPr lang="en-US" smtClean="0"/>
-              <a:t>22/3/2020</a:t>
+              <a:t>11/5/2020</a:t>
             </a:fld>
             <a:endParaRPr lang="en-US"/>
           </a:p>
@@ -8740,7 +8756,7 @@
           <a:p>
             <a:fld id="{29DDCA62-2A69-4F01-9E41-038E948DE023}" type="datetimeFigureOut">
               <a:rPr lang="en-US" smtClean="0"/>
-              <a:t>22/3/2020</a:t>
+              <a:t>11/5/2020</a:t>
             </a:fld>
             <a:endParaRPr lang="en-US"/>
           </a:p>
@@ -9015,7 +9031,7 @@
           <a:p>
             <a:fld id="{29DDCA62-2A69-4F01-9E41-038E948DE023}" type="datetimeFigureOut">
               <a:rPr lang="en-US" smtClean="0"/>
-              <a:t>22/3/2020</a:t>
+              <a:t>11/5/2020</a:t>
             </a:fld>
             <a:endParaRPr lang="en-US"/>
           </a:p>
@@ -9394,7 +9410,7 @@
           <a:p>
             <a:fld id="{29DDCA62-2A69-4F01-9E41-038E948DE023}" type="datetimeFigureOut">
               <a:rPr lang="en-US" smtClean="0"/>
-              <a:t>22/3/2020</a:t>
+              <a:t>11/5/2020</a:t>
             </a:fld>
             <a:endParaRPr lang="en-US"/>
           </a:p>
@@ -9512,7 +9528,7 @@
           <a:p>
             <a:fld id="{29DDCA62-2A69-4F01-9E41-038E948DE023}" type="datetimeFigureOut">
               <a:rPr lang="en-US" smtClean="0"/>
-              <a:t>22/3/2020</a:t>
+              <a:t>11/5/2020</a:t>
             </a:fld>
             <a:endParaRPr lang="en-US"/>
           </a:p>
@@ -9683,7 +9699,7 @@
           <a:p>
             <a:fld id="{29DDCA62-2A69-4F01-9E41-038E948DE023}" type="datetimeFigureOut">
               <a:rPr lang="en-US" smtClean="0"/>
-              <a:t>22/3/2020</a:t>
+              <a:t>11/5/2020</a:t>
             </a:fld>
             <a:endParaRPr lang="en-US"/>
           </a:p>
@@ -10037,7 +10053,7 @@
           <a:p>
             <a:fld id="{29DDCA62-2A69-4F01-9E41-038E948DE023}" type="datetimeFigureOut">
               <a:rPr lang="en-US" smtClean="0"/>
-              <a:t>22/3/2020</a:t>
+              <a:t>11/5/2020</a:t>
             </a:fld>
             <a:endParaRPr lang="en-US"/>
           </a:p>
@@ -10419,7 +10435,7 @@
           <a:p>
             <a:fld id="{29DDCA62-2A69-4F01-9E41-038E948DE023}" type="datetimeFigureOut">
               <a:rPr lang="en-US" smtClean="0"/>
-              <a:t>22/3/2020</a:t>
+              <a:t>11/5/2020</a:t>
             </a:fld>
             <a:endParaRPr lang="en-US"/>
           </a:p>
@@ -10706,7 +10722,7 @@
           <a:p>
             <a:fld id="{29DDCA62-2A69-4F01-9E41-038E948DE023}" type="datetimeFigureOut">
               <a:rPr lang="en-US" smtClean="0"/>
-              <a:t>22/3/2020</a:t>
+              <a:t>11/5/2020</a:t>
             </a:fld>
             <a:endParaRPr lang="en-US"/>
           </a:p>
@@ -11463,7 +11479,7 @@
         <p:spPr>
           <a:xfrm>
             <a:off x="1947025" y="1810327"/>
-            <a:ext cx="8358909" cy="1569660"/>
+            <a:ext cx="8358909" cy="830997"/>
           </a:xfrm>
           <a:prstGeom prst="rect">
             <a:avLst/>
@@ -11548,95 +11564,11 @@
               <a:t> </a:t>
             </a:r>
             <a:r>
-              <a:rPr lang="en-US" sz="4800" dirty="0" err="1">
+              <a:rPr lang="en-US" sz="4800" dirty="0" err="1" smtClean="0">
                 <a:latin typeface="+mj-lt"/>
                 <a:cs typeface="Arial" panose="020B0604020202020204" pitchFamily="34" charset="0"/>
               </a:rPr>
               <a:t>án</a:t>
-            </a:r>
-            <a:r>
-              <a:rPr lang="en-US" sz="4800" dirty="0">
-                <a:latin typeface="+mj-lt"/>
-                <a:cs typeface="Arial" panose="020B0604020202020204" pitchFamily="34" charset="0"/>
-              </a:rPr>
-              <a:t> </a:t>
-            </a:r>
-            <a:r>
-              <a:rPr lang="en-US" sz="4800" dirty="0" err="1">
-                <a:latin typeface="+mj-lt"/>
-                <a:cs typeface="Arial" panose="020B0604020202020204" pitchFamily="34" charset="0"/>
-              </a:rPr>
-              <a:t>tích</a:t>
-            </a:r>
-            <a:r>
-              <a:rPr lang="en-US" sz="4800" dirty="0">
-                <a:latin typeface="+mj-lt"/>
-                <a:cs typeface="Arial" panose="020B0604020202020204" pitchFamily="34" charset="0"/>
-              </a:rPr>
-              <a:t> </a:t>
-            </a:r>
-            <a:r>
-              <a:rPr lang="en-US" sz="4800" dirty="0" err="1">
-                <a:latin typeface="+mj-lt"/>
-                <a:cs typeface="Arial" panose="020B0604020202020204" pitchFamily="34" charset="0"/>
-              </a:rPr>
-              <a:t>hợp</a:t>
-            </a:r>
-            <a:r>
-              <a:rPr lang="en-US" sz="4800" dirty="0">
-                <a:latin typeface="+mj-lt"/>
-                <a:cs typeface="Arial" panose="020B0604020202020204" pitchFamily="34" charset="0"/>
-              </a:rPr>
-              <a:t> </a:t>
-            </a:r>
-            <a:r>
-              <a:rPr lang="en-US" sz="4800" dirty="0" err="1">
-                <a:latin typeface="+mj-lt"/>
-                <a:cs typeface="Arial" panose="020B0604020202020204" pitchFamily="34" charset="0"/>
-              </a:rPr>
-              <a:t>nhận</a:t>
-            </a:r>
-            <a:r>
-              <a:rPr lang="en-US" sz="4800" dirty="0">
-                <a:latin typeface="+mj-lt"/>
-                <a:cs typeface="Arial" panose="020B0604020202020204" pitchFamily="34" charset="0"/>
-              </a:rPr>
-              <a:t> </a:t>
-            </a:r>
-            <a:r>
-              <a:rPr lang="en-US" sz="4800" dirty="0" err="1">
-                <a:latin typeface="+mj-lt"/>
-                <a:cs typeface="Arial" panose="020B0604020202020204" pitchFamily="34" charset="0"/>
-              </a:rPr>
-              <a:t>diện</a:t>
-            </a:r>
-            <a:r>
-              <a:rPr lang="en-US" sz="4800" dirty="0">
-                <a:latin typeface="+mj-lt"/>
-                <a:cs typeface="Arial" panose="020B0604020202020204" pitchFamily="34" charset="0"/>
-              </a:rPr>
-              <a:t> </a:t>
-            </a:r>
-            <a:r>
-              <a:rPr lang="en-US" sz="4800" dirty="0" err="1">
-                <a:latin typeface="+mj-lt"/>
-                <a:cs typeface="Arial" panose="020B0604020202020204" pitchFamily="34" charset="0"/>
-              </a:rPr>
-              <a:t>khuôn</a:t>
-            </a:r>
-            <a:r>
-              <a:rPr lang="en-US" sz="4800" dirty="0">
-                <a:latin typeface="+mj-lt"/>
-                <a:cs typeface="Arial" panose="020B0604020202020204" pitchFamily="34" charset="0"/>
-              </a:rPr>
-              <a:t> </a:t>
-            </a:r>
-            <a:r>
-              <a:rPr lang="en-US" sz="4800" dirty="0" err="1">
-                <a:latin typeface="+mj-lt"/>
-                <a:cs typeface="Arial" panose="020B0604020202020204" pitchFamily="34" charset="0"/>
-              </a:rPr>
-              <a:t>mặt</a:t>
             </a:r>
             <a:endParaRPr lang="en-US" sz="4800" dirty="0">
               <a:latin typeface="+mj-lt"/>
@@ -11654,10 +11586,209 @@
   <p:clrMapOvr>
     <a:masterClrMapping/>
   </p:clrMapOvr>
+  <p:timing>
+    <p:tnLst>
+      <p:par>
+        <p:cTn id="1" dur="indefinite" restart="never" nodeType="tmRoot"/>
+      </p:par>
+    </p:tnLst>
+  </p:timing>
 </p:sld>
 </file>
 
 <file path=ppt/slides/slide10.xml><?xml version="1.0" encoding="utf-8"?>
+<p:sld xmlns:a="http://schemas.openxmlformats.org/drawingml/2006/main" xmlns:r="http://schemas.openxmlformats.org/officeDocument/2006/relationships" xmlns:p="http://schemas.openxmlformats.org/presentationml/2006/main">
+  <p:cSld>
+    <p:spTree>
+      <p:nvGrpSpPr>
+        <p:cNvPr id="1" name=""/>
+        <p:cNvGrpSpPr/>
+        <p:nvPr/>
+      </p:nvGrpSpPr>
+      <p:grpSpPr>
+        <a:xfrm>
+          <a:off x="0" y="0"/>
+          <a:ext cx="0" cy="0"/>
+          <a:chOff x="0" y="0"/>
+          <a:chExt cx="0" cy="0"/>
+        </a:xfrm>
+      </p:grpSpPr>
+      <p:sp>
+        <p:nvSpPr>
+          <p:cNvPr id="2" name="Title 1"/>
+          <p:cNvSpPr>
+            <a:spLocks noGrp="1"/>
+          </p:cNvSpPr>
+          <p:nvPr>
+            <p:ph type="title"/>
+          </p:nvPr>
+        </p:nvSpPr>
+        <p:spPr/>
+        <p:txBody>
+          <a:bodyPr/>
+          <a:lstStyle/>
+          <a:p>
+            <a:r>
+              <a:rPr lang="en-US" dirty="0" smtClean="0"/>
+              <a:t>3. </a:t>
+            </a:r>
+            <a:r>
+              <a:rPr lang="en-US" dirty="0" err="1" smtClean="0"/>
+              <a:t>Phân</a:t>
+            </a:r>
+            <a:r>
+              <a:rPr lang="en-US" dirty="0" smtClean="0"/>
+              <a:t> </a:t>
+            </a:r>
+            <a:r>
+              <a:rPr lang="en-US" dirty="0" err="1" smtClean="0"/>
+              <a:t>tích</a:t>
+            </a:r>
+            <a:r>
+              <a:rPr lang="en-US" dirty="0" smtClean="0"/>
+              <a:t> </a:t>
+            </a:r>
+            <a:r>
+              <a:rPr lang="en-US" dirty="0" err="1" smtClean="0"/>
+              <a:t>yêu</a:t>
+            </a:r>
+            <a:r>
+              <a:rPr lang="en-US" dirty="0" smtClean="0"/>
+              <a:t> </a:t>
+            </a:r>
+            <a:r>
+              <a:rPr lang="en-US" dirty="0" err="1" smtClean="0"/>
+              <a:t>cầu</a:t>
+            </a:r>
+            <a:r>
+              <a:rPr lang="en-US" dirty="0" smtClean="0"/>
+              <a:t> </a:t>
+            </a:r>
+            <a:endParaRPr lang="en-US" dirty="0"/>
+          </a:p>
+        </p:txBody>
+      </p:sp>
+      <p:pic>
+        <p:nvPicPr>
+          <p:cNvPr id="4" name="Picture 3"/>
+          <p:cNvPicPr/>
+          <p:nvPr/>
+        </p:nvPicPr>
+        <p:blipFill>
+          <a:blip r:embed="rId2">
+            <a:extLst>
+              <a:ext uri="{28A0092B-C50C-407E-A947-70E740481C1C}">
+                <a14:useLocalDpi xmlns:a14="http://schemas.microsoft.com/office/drawing/2010/main" val="0"/>
+              </a:ext>
+            </a:extLst>
+          </a:blip>
+          <a:stretch>
+            <a:fillRect/>
+          </a:stretch>
+        </p:blipFill>
+        <p:spPr>
+          <a:xfrm>
+            <a:off x="3017606" y="1912350"/>
+            <a:ext cx="6217747" cy="3620309"/>
+          </a:xfrm>
+          <a:prstGeom prst="rect">
+            <a:avLst/>
+          </a:prstGeom>
+          <a:ln w="3175">
+            <a:solidFill>
+              <a:schemeClr val="tx1"/>
+            </a:solidFill>
+          </a:ln>
+        </p:spPr>
+      </p:pic>
+      <p:sp>
+        <p:nvSpPr>
+          <p:cNvPr id="7" name="TextBox 6"/>
+          <p:cNvSpPr txBox="1"/>
+          <p:nvPr/>
+        </p:nvSpPr>
+        <p:spPr>
+          <a:xfrm>
+            <a:off x="4597855" y="5707649"/>
+            <a:ext cx="3057247" cy="461665"/>
+          </a:xfrm>
+          <a:prstGeom prst="rect">
+            <a:avLst/>
+          </a:prstGeom>
+          <a:noFill/>
+        </p:spPr>
+        <p:txBody>
+          <a:bodyPr wrap="none" rtlCol="0">
+            <a:spAutoFit/>
+          </a:bodyPr>
+          <a:lstStyle/>
+          <a:p>
+            <a:r>
+              <a:rPr lang="en-US" sz="2400" dirty="0" err="1" smtClean="0"/>
+              <a:t>Quản</a:t>
+            </a:r>
+            <a:r>
+              <a:rPr lang="en-US" sz="2400" dirty="0" smtClean="0"/>
+              <a:t> </a:t>
+            </a:r>
+            <a:r>
+              <a:rPr lang="en-US" sz="2400" dirty="0" err="1" smtClean="0"/>
+              <a:t>lý</a:t>
+            </a:r>
+            <a:r>
+              <a:rPr lang="en-US" sz="2400" dirty="0" smtClean="0"/>
+              <a:t> </a:t>
+            </a:r>
+            <a:r>
+              <a:rPr lang="en-US" sz="2400" dirty="0" err="1" smtClean="0"/>
+              <a:t>hồ</a:t>
+            </a:r>
+            <a:r>
+              <a:rPr lang="en-US" sz="2400" dirty="0" smtClean="0"/>
+              <a:t> </a:t>
+            </a:r>
+            <a:r>
+              <a:rPr lang="en-US" sz="2400" dirty="0" err="1" smtClean="0"/>
+              <a:t>sơ</a:t>
+            </a:r>
+            <a:r>
+              <a:rPr lang="en-US" sz="2400" dirty="0" smtClean="0"/>
+              <a:t> </a:t>
+            </a:r>
+            <a:r>
+              <a:rPr lang="en-US" sz="2400" dirty="0" err="1" smtClean="0"/>
+              <a:t>bệnh</a:t>
+            </a:r>
+            <a:r>
+              <a:rPr lang="en-US" sz="2400" dirty="0" smtClean="0"/>
+              <a:t> </a:t>
+            </a:r>
+            <a:r>
+              <a:rPr lang="en-US" sz="2400" dirty="0" err="1" smtClean="0"/>
+              <a:t>án</a:t>
+            </a:r>
+            <a:r>
+              <a:rPr lang="en-US" sz="2400" dirty="0" smtClean="0"/>
+              <a:t> </a:t>
+            </a:r>
+            <a:endParaRPr lang="en-US" sz="2400" dirty="0"/>
+          </a:p>
+        </p:txBody>
+      </p:sp>
+    </p:spTree>
+    <p:extLst>
+      <p:ext uri="{BB962C8B-B14F-4D97-AF65-F5344CB8AC3E}">
+        <p14:creationId xmlns:p14="http://schemas.microsoft.com/office/powerpoint/2010/main" val="2909805985"/>
+      </p:ext>
+    </p:extLst>
+  </p:cSld>
+  <p:clrMapOvr>
+    <a:masterClrMapping/>
+  </p:clrMapOvr>
+</p:sld>
+</file>
+
+<file path=ppt/slides/slide11.xml><?xml version="1.0" encoding="utf-8"?>
 <p:sld xmlns:a="http://schemas.openxmlformats.org/drawingml/2006/main" xmlns:r="http://schemas.openxmlformats.org/officeDocument/2006/relationships" xmlns:p="http://schemas.openxmlformats.org/presentationml/2006/main">
   <p:cSld>
     <p:spTree>
@@ -11831,7 +11962,7 @@
 </p:sld>
 </file>
 
-<file path=ppt/slides/slide11.xml><?xml version="1.0" encoding="utf-8"?>
+<file path=ppt/slides/slide12.xml><?xml version="1.0" encoding="utf-8"?>
 <p:sld xmlns:a="http://schemas.openxmlformats.org/drawingml/2006/main" xmlns:r="http://schemas.openxmlformats.org/officeDocument/2006/relationships" xmlns:p="http://schemas.openxmlformats.org/presentationml/2006/main">
   <p:cSld>
     <p:spTree>
@@ -11997,7 +12128,7 @@
 </p:sld>
 </file>
 
-<file path=ppt/slides/slide12.xml><?xml version="1.0" encoding="utf-8"?>
+<file path=ppt/slides/slide13.xml><?xml version="1.0" encoding="utf-8"?>
 <p:sld xmlns:a="http://schemas.openxmlformats.org/drawingml/2006/main" xmlns:r="http://schemas.openxmlformats.org/officeDocument/2006/relationships" xmlns:p="http://schemas.openxmlformats.org/presentationml/2006/main">
   <p:cSld>
     <p:spTree>
@@ -12322,7 +12453,7 @@
 </p:sld>
 </file>
 
-<file path=ppt/slides/slide13.xml><?xml version="1.0" encoding="utf-8"?>
+<file path=ppt/slides/slide14.xml><?xml version="1.0" encoding="utf-8"?>
 <p:sld xmlns:a="http://schemas.openxmlformats.org/drawingml/2006/main" xmlns:r="http://schemas.openxmlformats.org/officeDocument/2006/relationships" xmlns:p="http://schemas.openxmlformats.org/presentationml/2006/main">
   <p:cSld>
     <p:spTree>
@@ -12514,7 +12645,7 @@
 </p:sld>
 </file>
 
-<file path=ppt/slides/slide14.xml><?xml version="1.0" encoding="utf-8"?>
+<file path=ppt/slides/slide15.xml><?xml version="1.0" encoding="utf-8"?>
 <p:sld xmlns:a="http://schemas.openxmlformats.org/drawingml/2006/main" xmlns:r="http://schemas.openxmlformats.org/officeDocument/2006/relationships" xmlns:p="http://schemas.openxmlformats.org/presentationml/2006/main">
   <p:cSld>
     <p:spTree>
@@ -12706,158 +12837,6 @@
 </p:sld>
 </file>
 
-<file path=ppt/slides/slide15.xml><?xml version="1.0" encoding="utf-8"?>
-<p:sld xmlns:a="http://schemas.openxmlformats.org/drawingml/2006/main" xmlns:r="http://schemas.openxmlformats.org/officeDocument/2006/relationships" xmlns:p="http://schemas.openxmlformats.org/presentationml/2006/main">
-  <p:cSld>
-    <p:spTree>
-      <p:nvGrpSpPr>
-        <p:cNvPr id="1" name=""/>
-        <p:cNvGrpSpPr/>
-        <p:nvPr/>
-      </p:nvGrpSpPr>
-      <p:grpSpPr>
-        <a:xfrm>
-          <a:off x="0" y="0"/>
-          <a:ext cx="0" cy="0"/>
-          <a:chOff x="0" y="0"/>
-          <a:chExt cx="0" cy="0"/>
-        </a:xfrm>
-      </p:grpSpPr>
-      <p:sp>
-        <p:nvSpPr>
-          <p:cNvPr id="2" name="Title 1"/>
-          <p:cNvSpPr>
-            <a:spLocks noGrp="1"/>
-          </p:cNvSpPr>
-          <p:nvPr>
-            <p:ph type="title"/>
-          </p:nvPr>
-        </p:nvSpPr>
-        <p:spPr/>
-        <p:txBody>
-          <a:bodyPr/>
-          <a:lstStyle/>
-          <a:p>
-            <a:r>
-              <a:rPr lang="en-US" dirty="0" smtClean="0"/>
-              <a:t>4. </a:t>
-            </a:r>
-            <a:r>
-              <a:rPr lang="en-US" dirty="0" err="1" smtClean="0"/>
-              <a:t>Phân</a:t>
-            </a:r>
-            <a:r>
-              <a:rPr lang="en-US" dirty="0" smtClean="0"/>
-              <a:t> </a:t>
-            </a:r>
-            <a:r>
-              <a:rPr lang="en-US" dirty="0" err="1" smtClean="0"/>
-              <a:t>tích</a:t>
-            </a:r>
-            <a:r>
-              <a:rPr lang="en-US" dirty="0" smtClean="0"/>
-              <a:t> chi </a:t>
-            </a:r>
-            <a:r>
-              <a:rPr lang="en-US" dirty="0" err="1" smtClean="0"/>
-              <a:t>tiết</a:t>
-            </a:r>
-            <a:endParaRPr lang="en-US" dirty="0"/>
-          </a:p>
-        </p:txBody>
-      </p:sp>
-      <p:sp>
-        <p:nvSpPr>
-          <p:cNvPr id="5" name="TextBox 4"/>
-          <p:cNvSpPr txBox="1"/>
-          <p:nvPr/>
-        </p:nvSpPr>
-        <p:spPr>
-          <a:xfrm>
-            <a:off x="4930363" y="5933516"/>
-            <a:ext cx="1617751" cy="461665"/>
-          </a:xfrm>
-          <a:prstGeom prst="rect">
-            <a:avLst/>
-          </a:prstGeom>
-          <a:noFill/>
-        </p:spPr>
-        <p:txBody>
-          <a:bodyPr wrap="none" rtlCol="0">
-            <a:spAutoFit/>
-          </a:bodyPr>
-          <a:lstStyle/>
-          <a:p>
-            <a:r>
-              <a:rPr lang="en-US" sz="2400" dirty="0" err="1" smtClean="0"/>
-              <a:t>Biểu</a:t>
-            </a:r>
-            <a:r>
-              <a:rPr lang="en-US" sz="2400" dirty="0" smtClean="0"/>
-              <a:t> </a:t>
-            </a:r>
-            <a:r>
-              <a:rPr lang="en-US" sz="2400" dirty="0" err="1" smtClean="0"/>
-              <a:t>đồ</a:t>
-            </a:r>
-            <a:r>
-              <a:rPr lang="en-US" sz="2400" dirty="0" smtClean="0"/>
-              <a:t> </a:t>
-            </a:r>
-            <a:r>
-              <a:rPr lang="en-US" sz="2400" dirty="0" err="1" smtClean="0"/>
-              <a:t>lớp</a:t>
-            </a:r>
-            <a:endParaRPr lang="en-US" sz="2400" dirty="0"/>
-          </a:p>
-        </p:txBody>
-      </p:sp>
-      <p:pic>
-        <p:nvPicPr>
-          <p:cNvPr id="7" name="Picture 6"/>
-          <p:cNvPicPr/>
-          <p:nvPr/>
-        </p:nvPicPr>
-        <p:blipFill>
-          <a:blip r:embed="rId2" cstate="print">
-            <a:extLst>
-              <a:ext uri="{28A0092B-C50C-407E-A947-70E740481C1C}">
-                <a14:useLocalDpi xmlns:a14="http://schemas.microsoft.com/office/drawing/2010/main" val="0"/>
-              </a:ext>
-            </a:extLst>
-          </a:blip>
-          <a:stretch>
-            <a:fillRect/>
-          </a:stretch>
-        </p:blipFill>
-        <p:spPr>
-          <a:xfrm>
-            <a:off x="2641600" y="1884512"/>
-            <a:ext cx="6630094" cy="4132685"/>
-          </a:xfrm>
-          <a:prstGeom prst="rect">
-            <a:avLst/>
-          </a:prstGeom>
-          <a:ln w="6350">
-            <a:solidFill>
-              <a:schemeClr val="tx1"/>
-            </a:solidFill>
-          </a:ln>
-        </p:spPr>
-      </p:pic>
-    </p:spTree>
-    <p:extLst>
-      <p:ext uri="{BB962C8B-B14F-4D97-AF65-F5344CB8AC3E}">
-        <p14:creationId xmlns:p14="http://schemas.microsoft.com/office/powerpoint/2010/main" val="1500426541"/>
-      </p:ext>
-    </p:extLst>
-  </p:cSld>
-  <p:clrMapOvr>
-    <a:masterClrMapping/>
-  </p:clrMapOvr>
-</p:sld>
-</file>
-
 <file path=ppt/slides/slide16.xml><?xml version="1.0" encoding="utf-8"?>
 <p:sld xmlns:a="http://schemas.openxmlformats.org/drawingml/2006/main" xmlns:r="http://schemas.openxmlformats.org/officeDocument/2006/relationships" xmlns:p="http://schemas.openxmlformats.org/presentationml/2006/main">
   <p:cSld>
@@ -12926,7 +12905,159 @@
         </p:nvSpPr>
         <p:spPr>
           <a:xfrm>
-            <a:off x="4799429" y="5749963"/>
+            <a:off x="4930363" y="5933516"/>
+            <a:ext cx="1617751" cy="461665"/>
+          </a:xfrm>
+          <a:prstGeom prst="rect">
+            <a:avLst/>
+          </a:prstGeom>
+          <a:noFill/>
+        </p:spPr>
+        <p:txBody>
+          <a:bodyPr wrap="none" rtlCol="0">
+            <a:spAutoFit/>
+          </a:bodyPr>
+          <a:lstStyle/>
+          <a:p>
+            <a:r>
+              <a:rPr lang="en-US" sz="2400" dirty="0" err="1" smtClean="0"/>
+              <a:t>Biểu</a:t>
+            </a:r>
+            <a:r>
+              <a:rPr lang="en-US" sz="2400" dirty="0" smtClean="0"/>
+              <a:t> </a:t>
+            </a:r>
+            <a:r>
+              <a:rPr lang="en-US" sz="2400" dirty="0" err="1" smtClean="0"/>
+              <a:t>đồ</a:t>
+            </a:r>
+            <a:r>
+              <a:rPr lang="en-US" sz="2400" dirty="0" smtClean="0"/>
+              <a:t> </a:t>
+            </a:r>
+            <a:r>
+              <a:rPr lang="en-US" sz="2400" dirty="0" err="1" smtClean="0"/>
+              <a:t>lớp</a:t>
+            </a:r>
+            <a:endParaRPr lang="en-US" sz="2400" dirty="0"/>
+          </a:p>
+        </p:txBody>
+      </p:sp>
+      <p:pic>
+        <p:nvPicPr>
+          <p:cNvPr id="6" name="Picture 5"/>
+          <p:cNvPicPr/>
+          <p:nvPr/>
+        </p:nvPicPr>
+        <p:blipFill>
+          <a:blip r:embed="rId2" cstate="print">
+            <a:extLst>
+              <a:ext uri="{28A0092B-C50C-407E-A947-70E740481C1C}">
+                <a14:useLocalDpi xmlns:a14="http://schemas.microsoft.com/office/drawing/2010/main" val="0"/>
+              </a:ext>
+            </a:extLst>
+          </a:blip>
+          <a:stretch>
+            <a:fillRect/>
+          </a:stretch>
+        </p:blipFill>
+        <p:spPr>
+          <a:xfrm>
+            <a:off x="1876597" y="1805131"/>
+            <a:ext cx="7590675" cy="4202891"/>
+          </a:xfrm>
+          <a:prstGeom prst="rect">
+            <a:avLst/>
+          </a:prstGeom>
+          <a:ln w="6350">
+            <a:solidFill>
+              <a:schemeClr val="tx1"/>
+            </a:solidFill>
+          </a:ln>
+        </p:spPr>
+      </p:pic>
+    </p:spTree>
+    <p:extLst>
+      <p:ext uri="{BB962C8B-B14F-4D97-AF65-F5344CB8AC3E}">
+        <p14:creationId xmlns:p14="http://schemas.microsoft.com/office/powerpoint/2010/main" val="1500426541"/>
+      </p:ext>
+    </p:extLst>
+  </p:cSld>
+  <p:clrMapOvr>
+    <a:masterClrMapping/>
+  </p:clrMapOvr>
+</p:sld>
+</file>
+
+<file path=ppt/slides/slide17.xml><?xml version="1.0" encoding="utf-8"?>
+<p:sld xmlns:a="http://schemas.openxmlformats.org/drawingml/2006/main" xmlns:r="http://schemas.openxmlformats.org/officeDocument/2006/relationships" xmlns:p="http://schemas.openxmlformats.org/presentationml/2006/main">
+  <p:cSld>
+    <p:spTree>
+      <p:nvGrpSpPr>
+        <p:cNvPr id="1" name=""/>
+        <p:cNvGrpSpPr/>
+        <p:nvPr/>
+      </p:nvGrpSpPr>
+      <p:grpSpPr>
+        <a:xfrm>
+          <a:off x="0" y="0"/>
+          <a:ext cx="0" cy="0"/>
+          <a:chOff x="0" y="0"/>
+          <a:chExt cx="0" cy="0"/>
+        </a:xfrm>
+      </p:grpSpPr>
+      <p:sp>
+        <p:nvSpPr>
+          <p:cNvPr id="2" name="Title 1"/>
+          <p:cNvSpPr>
+            <a:spLocks noGrp="1"/>
+          </p:cNvSpPr>
+          <p:nvPr>
+            <p:ph type="title"/>
+          </p:nvPr>
+        </p:nvSpPr>
+        <p:spPr/>
+        <p:txBody>
+          <a:bodyPr/>
+          <a:lstStyle/>
+          <a:p>
+            <a:r>
+              <a:rPr lang="en-US" dirty="0" smtClean="0"/>
+              <a:t>4. </a:t>
+            </a:r>
+            <a:r>
+              <a:rPr lang="en-US" dirty="0" err="1" smtClean="0"/>
+              <a:t>Phân</a:t>
+            </a:r>
+            <a:r>
+              <a:rPr lang="en-US" dirty="0" smtClean="0"/>
+              <a:t> </a:t>
+            </a:r>
+            <a:r>
+              <a:rPr lang="en-US" dirty="0" err="1" smtClean="0"/>
+              <a:t>tích</a:t>
+            </a:r>
+            <a:r>
+              <a:rPr lang="en-US" dirty="0" smtClean="0"/>
+              <a:t> chi </a:t>
+            </a:r>
+            <a:r>
+              <a:rPr lang="en-US" dirty="0" err="1" smtClean="0"/>
+              <a:t>tiết</a:t>
+            </a:r>
+            <a:endParaRPr lang="en-US" dirty="0"/>
+          </a:p>
+        </p:txBody>
+      </p:sp>
+      <p:sp>
+        <p:nvSpPr>
+          <p:cNvPr id="5" name="TextBox 4"/>
+          <p:cNvSpPr txBox="1"/>
+          <p:nvPr/>
+        </p:nvSpPr>
+        <p:spPr>
+          <a:xfrm>
+            <a:off x="4799429" y="5823585"/>
             <a:ext cx="1835759" cy="461665"/>
           </a:xfrm>
           <a:prstGeom prst="rect">
@@ -12974,7 +13105,7 @@
       </p:sp>
       <p:pic>
         <p:nvPicPr>
-          <p:cNvPr id="3" name="Picture 2"/>
+          <p:cNvPr id="4" name="Picture 3"/>
           <p:cNvPicPr>
             <a:picLocks noChangeAspect="1"/>
           </p:cNvPicPr>
@@ -12988,8 +13119,8 @@
         </p:blipFill>
         <p:spPr>
           <a:xfrm>
-            <a:off x="3355109" y="1920913"/>
-            <a:ext cx="4724400" cy="3829050"/>
+            <a:off x="3369395" y="1820487"/>
+            <a:ext cx="4695825" cy="4086225"/>
           </a:xfrm>
           <a:prstGeom prst="rect">
             <a:avLst/>
@@ -13009,7 +13140,7 @@
 </p:sld>
 </file>
 
-<file path=ppt/slides/slide17.xml><?xml version="1.0" encoding="utf-8"?>
+<file path=ppt/slides/slide18.xml><?xml version="1.0" encoding="utf-8"?>
 <p:sld xmlns:a="http://schemas.openxmlformats.org/drawingml/2006/main" xmlns:r="http://schemas.openxmlformats.org/officeDocument/2006/relationships" xmlns:p="http://schemas.openxmlformats.org/presentationml/2006/main">
   <p:cSld>
     <p:spTree>
@@ -13109,7 +13240,7 @@
 </p:sld>
 </file>
 
-<file path=ppt/slides/slide18.xml><?xml version="1.0" encoding="utf-8"?>
+<file path=ppt/slides/slide19.xml><?xml version="1.0" encoding="utf-8"?>
 <p:sld xmlns:a="http://schemas.openxmlformats.org/drawingml/2006/main" xmlns:r="http://schemas.openxmlformats.org/officeDocument/2006/relationships" xmlns:p="http://schemas.openxmlformats.org/presentationml/2006/main">
   <p:cSld>
     <p:spTree>
@@ -13586,6 +13717,13 @@
   <p:clrMapOvr>
     <a:masterClrMapping/>
   </p:clrMapOvr>
+  <p:timing>
+    <p:tnLst>
+      <p:par>
+        <p:cTn id="1" dur="indefinite" restart="never" nodeType="tmRoot"/>
+      </p:par>
+    </p:tnLst>
+  </p:timing>
 </p:sld>
 </file>
 
@@ -13879,6 +14017,13 @@
   <p:clrMapOvr>
     <a:masterClrMapping/>
   </p:clrMapOvr>
+  <p:timing>
+    <p:tnLst>
+      <p:par>
+        <p:cTn id="1" dur="indefinite" restart="never" nodeType="tmRoot"/>
+      </p:par>
+    </p:tnLst>
+  </p:timing>
 </p:sld>
 </file>
 
@@ -14182,6 +14327,13 @@
   <p:clrMapOvr>
     <a:masterClrMapping/>
   </p:clrMapOvr>
+  <p:timing>
+    <p:tnLst>
+      <p:par>
+        <p:cTn id="1" dur="indefinite" restart="never" nodeType="tmRoot"/>
+      </p:par>
+    </p:tnLst>
+  </p:timing>
 </p:sld>
 </file>
 
@@ -14485,6 +14637,13 @@
   <p:clrMapOvr>
     <a:masterClrMapping/>
   </p:clrMapOvr>
+  <p:timing>
+    <p:tnLst>
+      <p:par>
+        <p:cTn id="1" dur="indefinite" restart="never" nodeType="tmRoot"/>
+      </p:par>
+    </p:tnLst>
+  </p:timing>
 </p:sld>
 </file>
 
@@ -15150,10 +15309,171 @@
   <p:clrMapOvr>
     <a:masterClrMapping/>
   </p:clrMapOvr>
+  <p:timing>
+    <p:tnLst>
+      <p:par>
+        <p:cTn id="1" dur="indefinite" restart="never" nodeType="tmRoot"/>
+      </p:par>
+    </p:tnLst>
+  </p:timing>
 </p:sld>
 </file>
 
 <file path=ppt/slides/slide7.xml><?xml version="1.0" encoding="utf-8"?>
+<p:sld xmlns:a="http://schemas.openxmlformats.org/drawingml/2006/main" xmlns:r="http://schemas.openxmlformats.org/officeDocument/2006/relationships" xmlns:p="http://schemas.openxmlformats.org/presentationml/2006/main">
+  <p:cSld>
+    <p:spTree>
+      <p:nvGrpSpPr>
+        <p:cNvPr id="1" name=""/>
+        <p:cNvGrpSpPr/>
+        <p:nvPr/>
+      </p:nvGrpSpPr>
+      <p:grpSpPr>
+        <a:xfrm>
+          <a:off x="0" y="0"/>
+          <a:ext cx="0" cy="0"/>
+          <a:chOff x="0" y="0"/>
+          <a:chExt cx="0" cy="0"/>
+        </a:xfrm>
+      </p:grpSpPr>
+      <p:sp>
+        <p:nvSpPr>
+          <p:cNvPr id="4" name="Title 1"/>
+          <p:cNvSpPr txBox="1">
+            <a:spLocks/>
+          </p:cNvSpPr>
+          <p:nvPr/>
+        </p:nvSpPr>
+        <p:spPr>
+          <a:xfrm>
+            <a:off x="1249680" y="439003"/>
+            <a:ext cx="10058400" cy="1450757"/>
+          </a:xfrm>
+          <a:prstGeom prst="rect">
+            <a:avLst/>
+          </a:prstGeom>
+        </p:spPr>
+        <p:txBody>
+          <a:bodyPr vert="horz" lIns="91440" tIns="45720" rIns="91440" bIns="45720" rtlCol="0" anchor="b">
+            <a:normAutofit/>
+          </a:bodyPr>
+          <a:lstStyle>
+            <a:lvl1pPr marL="0" algn="l" defTabSz="914400" rtl="0" eaLnBrk="1" latinLnBrk="0" hangingPunct="1">
+              <a:lnSpc>
+                <a:spcPct val="85000"/>
+              </a:lnSpc>
+              <a:spcBef>
+                <a:spcPct val="0"/>
+              </a:spcBef>
+              <a:buNone/>
+              <a:defRPr sz="4800" kern="1200" spc="-50" baseline="0">
+                <a:solidFill>
+                  <a:schemeClr val="tx1">
+                    <a:lumMod val="75000"/>
+                    <a:lumOff val="25000"/>
+                  </a:schemeClr>
+                </a:solidFill>
+                <a:latin typeface="+mj-lt"/>
+                <a:ea typeface="+mj-ea"/>
+                <a:cs typeface="+mj-cs"/>
+              </a:defRPr>
+            </a:lvl1pPr>
+          </a:lstStyle>
+          <a:p>
+            <a:r>
+              <a:rPr lang="en-US" dirty="0" smtClean="0"/>
+              <a:t>1. </a:t>
+            </a:r>
+            <a:r>
+              <a:rPr lang="en-US" dirty="0" err="1" smtClean="0"/>
+              <a:t>Thực</a:t>
+            </a:r>
+            <a:r>
+              <a:rPr lang="en-US" dirty="0" smtClean="0"/>
+              <a:t> </a:t>
+            </a:r>
+            <a:r>
+              <a:rPr lang="en-US" dirty="0" err="1" smtClean="0"/>
+              <a:t>trạng</a:t>
+            </a:r>
+            <a:r>
+              <a:rPr lang="en-US" dirty="0" smtClean="0"/>
+              <a:t> </a:t>
+            </a:r>
+            <a:r>
+              <a:rPr lang="en-US" dirty="0" err="1" smtClean="0"/>
+              <a:t>và</a:t>
+            </a:r>
+            <a:r>
+              <a:rPr lang="en-US" dirty="0" smtClean="0"/>
+              <a:t> </a:t>
+            </a:r>
+            <a:r>
+              <a:rPr lang="en-US" dirty="0" err="1" smtClean="0"/>
+              <a:t>bài</a:t>
+            </a:r>
+            <a:r>
+              <a:rPr lang="en-US" dirty="0" smtClean="0"/>
+              <a:t> </a:t>
+            </a:r>
+            <a:r>
+              <a:rPr lang="en-US" dirty="0" err="1" smtClean="0"/>
+              <a:t>toán</a:t>
+            </a:r>
+            <a:endParaRPr lang="en-US" dirty="0"/>
+          </a:p>
+        </p:txBody>
+      </p:sp>
+      <p:pic>
+        <p:nvPicPr>
+          <p:cNvPr id="6" name="Picture 5"/>
+          <p:cNvPicPr>
+            <a:picLocks noChangeAspect="1"/>
+          </p:cNvPicPr>
+          <p:nvPr/>
+        </p:nvPicPr>
+        <p:blipFill>
+          <a:blip r:embed="rId2"/>
+          <a:stretch>
+            <a:fillRect/>
+          </a:stretch>
+        </p:blipFill>
+        <p:spPr>
+          <a:xfrm>
+            <a:off x="2894979" y="2156332"/>
+            <a:ext cx="6767801" cy="3699895"/>
+          </a:xfrm>
+          <a:prstGeom prst="rect">
+            <a:avLst/>
+          </a:prstGeom>
+          <a:ln>
+            <a:solidFill>
+              <a:schemeClr val="tx1"/>
+            </a:solidFill>
+          </a:ln>
+        </p:spPr>
+      </p:pic>
+    </p:spTree>
+    <p:extLst>
+      <p:ext uri="{BB962C8B-B14F-4D97-AF65-F5344CB8AC3E}">
+        <p14:creationId xmlns:p14="http://schemas.microsoft.com/office/powerpoint/2010/main" val="3325469559"/>
+      </p:ext>
+    </p:extLst>
+  </p:cSld>
+  <p:clrMapOvr>
+    <a:masterClrMapping/>
+  </p:clrMapOvr>
+  <p:timing>
+    <p:tnLst>
+      <p:par>
+        <p:cTn id="1" dur="indefinite" restart="never" nodeType="tmRoot"/>
+      </p:par>
+    </p:tnLst>
+  </p:timing>
+</p:sld>
+</file>
+
+<file path=ppt/slides/slide8.xml><?xml version="1.0" encoding="utf-8"?>
 <p:sld xmlns:a="http://schemas.openxmlformats.org/drawingml/2006/main" xmlns:r="http://schemas.openxmlformats.org/officeDocument/2006/relationships" xmlns:p="http://schemas.openxmlformats.org/presentationml/2006/main">
   <p:cSld>
     <p:spTree>
@@ -15607,10 +15927,17 @@
   <p:clrMapOvr>
     <a:masterClrMapping/>
   </p:clrMapOvr>
+  <p:timing>
+    <p:tnLst>
+      <p:par>
+        <p:cTn id="1" dur="indefinite" restart="never" nodeType="tmRoot"/>
+      </p:par>
+    </p:tnLst>
+  </p:timing>
 </p:sld>
 </file>
 
-<file path=ppt/slides/slide8.xml><?xml version="1.0" encoding="utf-8"?>
+<file path=ppt/slides/slide9.xml><?xml version="1.0" encoding="utf-8"?>
 <p:sld xmlns:a="http://schemas.openxmlformats.org/drawingml/2006/main" xmlns:r="http://schemas.openxmlformats.org/officeDocument/2006/relationships" xmlns:p="http://schemas.openxmlformats.org/presentationml/2006/main">
   <p:cSld>
     <p:spTree>
@@ -16100,198 +16427,6 @@
 </p:sld>
 </file>
 
-<file path=ppt/slides/slide9.xml><?xml version="1.0" encoding="utf-8"?>
-<p:sld xmlns:a="http://schemas.openxmlformats.org/drawingml/2006/main" xmlns:r="http://schemas.openxmlformats.org/officeDocument/2006/relationships" xmlns:p="http://schemas.openxmlformats.org/presentationml/2006/main">
-  <p:cSld>
-    <p:spTree>
-      <p:nvGrpSpPr>
-        <p:cNvPr id="1" name=""/>
-        <p:cNvGrpSpPr/>
-        <p:nvPr/>
-      </p:nvGrpSpPr>
-      <p:grpSpPr>
-        <a:xfrm>
-          <a:off x="0" y="0"/>
-          <a:ext cx="0" cy="0"/>
-          <a:chOff x="0" y="0"/>
-          <a:chExt cx="0" cy="0"/>
-        </a:xfrm>
-      </p:grpSpPr>
-      <p:sp>
-        <p:nvSpPr>
-          <p:cNvPr id="2" name="Title 1"/>
-          <p:cNvSpPr>
-            <a:spLocks noGrp="1"/>
-          </p:cNvSpPr>
-          <p:nvPr>
-            <p:ph type="title"/>
-          </p:nvPr>
-        </p:nvSpPr>
-        <p:spPr/>
-        <p:txBody>
-          <a:bodyPr/>
-          <a:lstStyle/>
-          <a:p>
-            <a:r>
-              <a:rPr lang="en-US" dirty="0" smtClean="0"/>
-              <a:t>3. </a:t>
-            </a:r>
-            <a:r>
-              <a:rPr lang="en-US" dirty="0" err="1" smtClean="0"/>
-              <a:t>Phân</a:t>
-            </a:r>
-            <a:r>
-              <a:rPr lang="en-US" dirty="0" smtClean="0"/>
-              <a:t> </a:t>
-            </a:r>
-            <a:r>
-              <a:rPr lang="en-US" dirty="0" err="1" smtClean="0"/>
-              <a:t>tích</a:t>
-            </a:r>
-            <a:r>
-              <a:rPr lang="en-US" dirty="0" smtClean="0"/>
-              <a:t> </a:t>
-            </a:r>
-            <a:r>
-              <a:rPr lang="en-US" dirty="0" err="1" smtClean="0"/>
-              <a:t>yêu</a:t>
-            </a:r>
-            <a:r>
-              <a:rPr lang="en-US" dirty="0" smtClean="0"/>
-              <a:t> </a:t>
-            </a:r>
-            <a:r>
-              <a:rPr lang="en-US" dirty="0" err="1" smtClean="0"/>
-              <a:t>cầu</a:t>
-            </a:r>
-            <a:r>
-              <a:rPr lang="en-US" dirty="0" smtClean="0"/>
-              <a:t> </a:t>
-            </a:r>
-            <a:endParaRPr lang="en-US" dirty="0"/>
-          </a:p>
-        </p:txBody>
-      </p:sp>
-      <p:pic>
-        <p:nvPicPr>
-          <p:cNvPr id="4" name="Picture 3"/>
-          <p:cNvPicPr/>
-          <p:nvPr/>
-        </p:nvPicPr>
-        <p:blipFill>
-          <a:blip r:embed="rId2">
-            <a:extLst>
-              <a:ext uri="{28A0092B-C50C-407E-A947-70E740481C1C}">
-                <a14:useLocalDpi xmlns:a14="http://schemas.microsoft.com/office/drawing/2010/main" val="0"/>
-              </a:ext>
-            </a:extLst>
-          </a:blip>
-          <a:stretch>
-            <a:fillRect/>
-          </a:stretch>
-        </p:blipFill>
-        <p:spPr>
-          <a:xfrm>
-            <a:off x="3017606" y="1912350"/>
-            <a:ext cx="6217747" cy="3620309"/>
-          </a:xfrm>
-          <a:prstGeom prst="rect">
-            <a:avLst/>
-          </a:prstGeom>
-          <a:ln w="3175">
-            <a:solidFill>
-              <a:schemeClr val="tx1"/>
-            </a:solidFill>
-          </a:ln>
-        </p:spPr>
-      </p:pic>
-      <p:sp>
-        <p:nvSpPr>
-          <p:cNvPr id="7" name="TextBox 6"/>
-          <p:cNvSpPr txBox="1"/>
-          <p:nvPr/>
-        </p:nvSpPr>
-        <p:spPr>
-          <a:xfrm>
-            <a:off x="4597855" y="5707649"/>
-            <a:ext cx="3057247" cy="461665"/>
-          </a:xfrm>
-          <a:prstGeom prst="rect">
-            <a:avLst/>
-          </a:prstGeom>
-          <a:noFill/>
-        </p:spPr>
-        <p:txBody>
-          <a:bodyPr wrap="none" rtlCol="0">
-            <a:spAutoFit/>
-          </a:bodyPr>
-          <a:lstStyle/>
-          <a:p>
-            <a:r>
-              <a:rPr lang="en-US" sz="2400" dirty="0" err="1" smtClean="0"/>
-              <a:t>Quản</a:t>
-            </a:r>
-            <a:r>
-              <a:rPr lang="en-US" sz="2400" dirty="0" smtClean="0"/>
-              <a:t> </a:t>
-            </a:r>
-            <a:r>
-              <a:rPr lang="en-US" sz="2400" dirty="0" err="1" smtClean="0"/>
-              <a:t>lý</a:t>
-            </a:r>
-            <a:r>
-              <a:rPr lang="en-US" sz="2400" dirty="0" smtClean="0"/>
-              <a:t> </a:t>
-            </a:r>
-            <a:r>
-              <a:rPr lang="en-US" sz="2400" dirty="0" err="1" smtClean="0"/>
-              <a:t>hồ</a:t>
-            </a:r>
-            <a:r>
-              <a:rPr lang="en-US" sz="2400" dirty="0" smtClean="0"/>
-              <a:t> </a:t>
-            </a:r>
-            <a:r>
-              <a:rPr lang="en-US" sz="2400" dirty="0" err="1" smtClean="0"/>
-              <a:t>sơ</a:t>
-            </a:r>
-            <a:r>
-              <a:rPr lang="en-US" sz="2400" dirty="0" smtClean="0"/>
-              <a:t> </a:t>
-            </a:r>
-            <a:r>
-              <a:rPr lang="en-US" sz="2400" dirty="0" err="1" smtClean="0"/>
-              <a:t>bệnh</a:t>
-            </a:r>
-            <a:r>
-              <a:rPr lang="en-US" sz="2400" dirty="0" smtClean="0"/>
-              <a:t> </a:t>
-            </a:r>
-            <a:r>
-              <a:rPr lang="en-US" sz="2400" dirty="0" err="1" smtClean="0"/>
-              <a:t>án</a:t>
-            </a:r>
-            <a:r>
-              <a:rPr lang="en-US" sz="2400" dirty="0" smtClean="0"/>
-              <a:t> </a:t>
-            </a:r>
-            <a:endParaRPr lang="en-US" sz="2400" dirty="0"/>
-          </a:p>
-        </p:txBody>
-      </p:sp>
-    </p:spTree>
-    <p:extLst>
-      <p:ext uri="{BB962C8B-B14F-4D97-AF65-F5344CB8AC3E}">
-        <p14:creationId xmlns:p14="http://schemas.microsoft.com/office/powerpoint/2010/main" val="2909805985"/>
-      </p:ext>
-    </p:extLst>
-  </p:cSld>
-  <p:clrMapOvr>
-    <a:masterClrMapping/>
-  </p:clrMapOvr>
-</p:sld>
-</file>
-
 <file path=ppt/theme/theme1.xml><?xml version="1.0" encoding="utf-8"?>
 <a:theme xmlns:a="http://schemas.openxmlformats.org/drawingml/2006/main" name="Retrospect">
   <a:themeElements>

</xml_diff>